<commit_message>
small change in documentation
</commit_message>
<xml_diff>
--- a/TomasHardyGame/presentation.pptx
+++ b/TomasHardyGame/presentation.pptx
@@ -147,7 +147,7 @@
   </p:defaultTextStyle>
   <p:extLst>
     <p:ext uri="{EFAFB233-063F-42B5-8137-9DF3F51BA10A}">
-      <p15:sldGuideLst xmlns:p15="http://schemas.microsoft.com/office/powerpoint/2012/main">
+      <p15:sldGuideLst xmlns:p15="http://schemas.microsoft.com/office/powerpoint/2012/main" xmlns="">
         <p15:guide id="1" orient="horz" pos="2160">
           <p15:clr>
             <a:srgbClr val="A4A3A4"/>
@@ -161,7 +161,7 @@
       </p15:sldGuideLst>
     </p:ext>
     <p:ext uri="{2D200454-40CA-4A62-9FC3-DE9A4176ACB9}">
-      <p15:notesGuideLst xmlns:p15="http://schemas.microsoft.com/office/powerpoint/2012/main">
+      <p15:notesGuideLst xmlns:p15="http://schemas.microsoft.com/office/powerpoint/2012/main" xmlns="">
         <p15:guide id="1" orient="horz" pos="2928">
           <p15:clr>
             <a:srgbClr val="A4A3A4"/>
@@ -6222,7 +6222,7 @@
             </a:r>
             <a:r>
               <a:rPr lang="en-US" dirty="0" err="1" smtClean="0"/>
-              <a:t>ivosss</a:t>
+              <a:t>ivossss</a:t>
             </a:r>
             <a:endParaRPr lang="en-US" dirty="0" smtClean="0"/>
           </a:p>
@@ -6232,7 +6232,7 @@
               <a:t>Делян Николов – </a:t>
             </a:r>
             <a:r>
-              <a:rPr lang="en-US"/>
+              <a:rPr lang="en-US" dirty="0"/>
               <a:t>delyan_nikolov_1992</a:t>
             </a:r>
             <a:endParaRPr lang="en-US" dirty="0" smtClean="0"/>
@@ -6336,6 +6336,13 @@
   <p:clrMapOvr>
     <a:masterClrMapping/>
   </p:clrMapOvr>
+  <p:timing>
+    <p:tnLst>
+      <p:par>
+        <p:cTn id="1" dur="indefinite" restart="never" nodeType="tmRoot"/>
+      </p:par>
+    </p:tnLst>
+  </p:timing>
 </p:sld>
 </file>
 
@@ -7156,6 +7163,13 @@
   <p:clrMapOvr>
     <a:masterClrMapping/>
   </p:clrMapOvr>
+  <p:timing>
+    <p:tnLst>
+      <p:par>
+        <p:cTn id="1" dur="indefinite" restart="never" nodeType="tmRoot"/>
+      </p:par>
+    </p:tnLst>
+  </p:timing>
 </p:sld>
 </file>
 
@@ -7472,15 +7486,7 @@
             </a:pPr>
             <a:r>
               <a:rPr lang="en-US" dirty="0" smtClean="0"/>
-              <a:t>31</a:t>
-            </a:r>
-            <a:r>
-              <a:rPr lang="en-US" dirty="0" smtClean="0"/>
-              <a:t> </a:t>
-            </a:r>
-            <a:r>
-              <a:rPr lang="en-US" dirty="0" smtClean="0"/>
-              <a:t>classes</a:t>
+              <a:t>31 classes</a:t>
             </a:r>
           </a:p>
           <a:p>
@@ -7494,11 +7500,7 @@
             </a:r>
             <a:r>
               <a:rPr lang="en-US" dirty="0" smtClean="0"/>
-              <a:t> </a:t>
-            </a:r>
-            <a:r>
-              <a:rPr lang="en-US" dirty="0" smtClean="0"/>
-              <a:t>abstract classes</a:t>
+              <a:t> abstract classes</a:t>
             </a:r>
           </a:p>
           <a:p>
@@ -7512,17 +7514,8 @@
             </a:r>
             <a:r>
               <a:rPr lang="en-US" dirty="0" smtClean="0"/>
-              <a:t> </a:t>
-            </a:r>
-            <a:r>
-              <a:rPr lang="en-US" dirty="0" smtClean="0"/>
-              <a:t>static </a:t>
-            </a:r>
-            <a:r>
-              <a:rPr lang="en-US" dirty="0" smtClean="0"/>
-              <a:t>class</a:t>
-            </a:r>
-            <a:endParaRPr lang="en-US" dirty="0" smtClean="0"/>
+              <a:t> static class</a:t>
+            </a:r>
           </a:p>
           <a:p>
             <a:pPr marL="342900" indent="-342900">
@@ -7535,11 +7528,7 @@
             </a:r>
             <a:r>
               <a:rPr lang="en-US" dirty="0" smtClean="0"/>
-              <a:t> </a:t>
-            </a:r>
-            <a:r>
-              <a:rPr lang="en-US" dirty="0" smtClean="0"/>
-              <a:t>interface</a:t>
+              <a:t> interface</a:t>
             </a:r>
           </a:p>
           <a:p>
@@ -7569,11 +7558,7 @@
             </a:pPr>
             <a:r>
               <a:rPr lang="en-US" dirty="0" smtClean="0"/>
-              <a:t>1 </a:t>
-            </a:r>
-            <a:r>
-              <a:rPr lang="en-US" dirty="0" smtClean="0"/>
-              <a:t>design pattern – Singleton</a:t>
+              <a:t>1 design pattern – Singleton</a:t>
             </a:r>
           </a:p>
           <a:p>
@@ -7622,6 +7607,13 @@
   <p:clrMapOvr>
     <a:masterClrMapping/>
   </p:clrMapOvr>
+  <p:timing>
+    <p:tnLst>
+      <p:par>
+        <p:cTn id="1" dur="indefinite" restart="never" nodeType="tmRoot"/>
+      </p:par>
+    </p:tnLst>
+  </p:timing>
 </p:sld>
 </file>
 

</xml_diff>